<commit_message>
220808 hangman, lotto update
</commit_message>
<xml_diff>
--- a/Project/C_행맨 프로젝트/Hangman_algo_part.pptx
+++ b/Project/C_행맨 프로젝트/Hangman_algo_part.pptx
@@ -8,6 +8,7 @@
     <p:sldId id="256" r:id="rId5"/>
     <p:sldId id="257" r:id="rId6"/>
     <p:sldId id="258" r:id="rId7"/>
+    <p:sldId id="259" r:id="rId8"/>
   </p:sldIdLst>
   <p:sldSz cx="12192000" cy="6858000"/>
   <p:notesSz cx="6858000" cy="9144000"/>
@@ -106,6 +107,11 @@
       </a:defRPr>
     </a:lvl9pPr>
   </p:defaultTextStyle>
+  <p:extLst>
+    <p:ext uri="{EFAFB233-063F-42B5-8137-9DF3F51BA10A}">
+      <p15:sldGuideLst xmlns:p15="http://schemas.microsoft.com/office/powerpoint/2012/main"/>
+    </p:ext>
+  </p:extLst>
 </p:presentation>
 </file>
 
@@ -256,7 +262,7 @@
           <a:p>
             <a:fld id="{73358578-186E-4B38-AB35-104970EFFA78}" type="datetimeFigureOut">
               <a:rPr lang="ko-KR" altLang="en-US" smtClean="0"/>
-              <a:t>2022-08-06</a:t>
+              <a:t>2022-08-08</a:t>
             </a:fld>
             <a:endParaRPr lang="ko-KR" altLang="en-US"/>
           </a:p>
@@ -454,7 +460,7 @@
           <a:p>
             <a:fld id="{73358578-186E-4B38-AB35-104970EFFA78}" type="datetimeFigureOut">
               <a:rPr lang="ko-KR" altLang="en-US" smtClean="0"/>
-              <a:t>2022-08-06</a:t>
+              <a:t>2022-08-08</a:t>
             </a:fld>
             <a:endParaRPr lang="ko-KR" altLang="en-US"/>
           </a:p>
@@ -662,7 +668,7 @@
           <a:p>
             <a:fld id="{73358578-186E-4B38-AB35-104970EFFA78}" type="datetimeFigureOut">
               <a:rPr lang="ko-KR" altLang="en-US" smtClean="0"/>
-              <a:t>2022-08-06</a:t>
+              <a:t>2022-08-08</a:t>
             </a:fld>
             <a:endParaRPr lang="ko-KR" altLang="en-US"/>
           </a:p>
@@ -860,7 +866,7 @@
           <a:p>
             <a:fld id="{73358578-186E-4B38-AB35-104970EFFA78}" type="datetimeFigureOut">
               <a:rPr lang="ko-KR" altLang="en-US" smtClean="0"/>
-              <a:t>2022-08-06</a:t>
+              <a:t>2022-08-08</a:t>
             </a:fld>
             <a:endParaRPr lang="ko-KR" altLang="en-US"/>
           </a:p>
@@ -1135,7 +1141,7 @@
           <a:p>
             <a:fld id="{73358578-186E-4B38-AB35-104970EFFA78}" type="datetimeFigureOut">
               <a:rPr lang="ko-KR" altLang="en-US" smtClean="0"/>
-              <a:t>2022-08-06</a:t>
+              <a:t>2022-08-08</a:t>
             </a:fld>
             <a:endParaRPr lang="ko-KR" altLang="en-US"/>
           </a:p>
@@ -1400,7 +1406,7 @@
           <a:p>
             <a:fld id="{73358578-186E-4B38-AB35-104970EFFA78}" type="datetimeFigureOut">
               <a:rPr lang="ko-KR" altLang="en-US" smtClean="0"/>
-              <a:t>2022-08-06</a:t>
+              <a:t>2022-08-08</a:t>
             </a:fld>
             <a:endParaRPr lang="ko-KR" altLang="en-US"/>
           </a:p>
@@ -1812,7 +1818,7 @@
           <a:p>
             <a:fld id="{73358578-186E-4B38-AB35-104970EFFA78}" type="datetimeFigureOut">
               <a:rPr lang="ko-KR" altLang="en-US" smtClean="0"/>
-              <a:t>2022-08-06</a:t>
+              <a:t>2022-08-08</a:t>
             </a:fld>
             <a:endParaRPr lang="ko-KR" altLang="en-US"/>
           </a:p>
@@ -1953,7 +1959,7 @@
           <a:p>
             <a:fld id="{73358578-186E-4B38-AB35-104970EFFA78}" type="datetimeFigureOut">
               <a:rPr lang="ko-KR" altLang="en-US" smtClean="0"/>
-              <a:t>2022-08-06</a:t>
+              <a:t>2022-08-08</a:t>
             </a:fld>
             <a:endParaRPr lang="ko-KR" altLang="en-US"/>
           </a:p>
@@ -2066,7 +2072,7 @@
           <a:p>
             <a:fld id="{73358578-186E-4B38-AB35-104970EFFA78}" type="datetimeFigureOut">
               <a:rPr lang="ko-KR" altLang="en-US" smtClean="0"/>
-              <a:t>2022-08-06</a:t>
+              <a:t>2022-08-08</a:t>
             </a:fld>
             <a:endParaRPr lang="ko-KR" altLang="en-US"/>
           </a:p>
@@ -2377,7 +2383,7 @@
           <a:p>
             <a:fld id="{73358578-186E-4B38-AB35-104970EFFA78}" type="datetimeFigureOut">
               <a:rPr lang="ko-KR" altLang="en-US" smtClean="0"/>
-              <a:t>2022-08-06</a:t>
+              <a:t>2022-08-08</a:t>
             </a:fld>
             <a:endParaRPr lang="ko-KR" altLang="en-US"/>
           </a:p>
@@ -2665,7 +2671,7 @@
           <a:p>
             <a:fld id="{73358578-186E-4B38-AB35-104970EFFA78}" type="datetimeFigureOut">
               <a:rPr lang="ko-KR" altLang="en-US" smtClean="0"/>
-              <a:t>2022-08-06</a:t>
+              <a:t>2022-08-08</a:t>
             </a:fld>
             <a:endParaRPr lang="ko-KR" altLang="en-US"/>
           </a:p>
@@ -2906,7 +2912,7 @@
           <a:p>
             <a:fld id="{73358578-186E-4B38-AB35-104970EFFA78}" type="datetimeFigureOut">
               <a:rPr lang="ko-KR" altLang="en-US" smtClean="0"/>
-              <a:t>2022-08-06</a:t>
+              <a:t>2022-08-08</a:t>
             </a:fld>
             <a:endParaRPr lang="ko-KR" altLang="en-US"/>
           </a:p>
@@ -4059,6 +4065,232 @@
 </p:sld>
 </file>
 
+<file path=ppt/slides/slide4.xml><?xml version="1.0" encoding="utf-8"?>
+<p:sld xmlns:a="http://schemas.openxmlformats.org/drawingml/2006/main" xmlns:r="http://schemas.openxmlformats.org/officeDocument/2006/relationships" xmlns:p="http://schemas.openxmlformats.org/presentationml/2006/main">
+  <p:cSld>
+    <p:spTree>
+      <p:nvGrpSpPr>
+        <p:cNvPr id="1" name=""/>
+        <p:cNvGrpSpPr/>
+        <p:nvPr/>
+      </p:nvGrpSpPr>
+      <p:grpSpPr>
+        <a:xfrm>
+          <a:off x="0" y="0"/>
+          <a:ext cx="0" cy="0"/>
+          <a:chOff x="0" y="0"/>
+          <a:chExt cx="0" cy="0"/>
+        </a:xfrm>
+      </p:grpSpPr>
+      <p:grpSp>
+        <p:nvGrpSpPr>
+          <p:cNvPr id="8" name="그룹 7">
+            <a:extLst>
+              <a:ext uri="{FF2B5EF4-FFF2-40B4-BE49-F238E27FC236}">
+                <a16:creationId xmlns:a16="http://schemas.microsoft.com/office/drawing/2014/main" id="{01889ED7-977B-0546-4907-1138FC3ACDDF}"/>
+              </a:ext>
+            </a:extLst>
+          </p:cNvPr>
+          <p:cNvGrpSpPr/>
+          <p:nvPr/>
+        </p:nvGrpSpPr>
+        <p:grpSpPr>
+          <a:xfrm>
+            <a:off x="379525" y="295931"/>
+            <a:ext cx="4173425" cy="6266137"/>
+            <a:chOff x="379525" y="326101"/>
+            <a:chExt cx="4894140" cy="7083036"/>
+          </a:xfrm>
+        </p:grpSpPr>
+        <p:pic>
+          <p:nvPicPr>
+            <p:cNvPr id="5" name="그림 4" descr="텍스트이(가) 표시된 사진&#10;&#10;자동 생성된 설명">
+              <a:extLst>
+                <a:ext uri="{FF2B5EF4-FFF2-40B4-BE49-F238E27FC236}">
+                  <a16:creationId xmlns:a16="http://schemas.microsoft.com/office/drawing/2014/main" id="{C01D4B02-C754-05C1-F966-3C68C6887419}"/>
+                </a:ext>
+              </a:extLst>
+            </p:cNvPr>
+            <p:cNvPicPr>
+              <a:picLocks noChangeAspect="1"/>
+            </p:cNvPicPr>
+            <p:nvPr/>
+          </p:nvPicPr>
+          <p:blipFill>
+            <a:blip r:embed="rId2">
+              <a:extLst>
+                <a:ext uri="{28A0092B-C50C-407E-A947-70E740481C1C}">
+                  <a14:useLocalDpi xmlns:a14="http://schemas.microsoft.com/office/drawing/2010/main" val="0"/>
+                </a:ext>
+              </a:extLst>
+            </a:blip>
+            <a:stretch>
+              <a:fillRect/>
+            </a:stretch>
+          </p:blipFill>
+          <p:spPr>
+            <a:xfrm>
+              <a:off x="379525" y="326101"/>
+              <a:ext cx="4894140" cy="2948944"/>
+            </a:xfrm>
+            <a:prstGeom prst="rect">
+              <a:avLst/>
+            </a:prstGeom>
+          </p:spPr>
+        </p:pic>
+        <p:pic>
+          <p:nvPicPr>
+            <p:cNvPr id="7" name="그림 6" descr="텍스트이(가) 표시된 사진&#10;&#10;자동 생성된 설명">
+              <a:extLst>
+                <a:ext uri="{FF2B5EF4-FFF2-40B4-BE49-F238E27FC236}">
+                  <a16:creationId xmlns:a16="http://schemas.microsoft.com/office/drawing/2014/main" id="{FA00CA0D-C57E-2FF9-77C2-482912EE80DC}"/>
+                </a:ext>
+              </a:extLst>
+            </p:cNvPr>
+            <p:cNvPicPr>
+              <a:picLocks noChangeAspect="1"/>
+            </p:cNvPicPr>
+            <p:nvPr/>
+          </p:nvPicPr>
+          <p:blipFill>
+            <a:blip r:embed="rId3">
+              <a:extLst>
+                <a:ext uri="{28A0092B-C50C-407E-A947-70E740481C1C}">
+                  <a14:useLocalDpi xmlns:a14="http://schemas.microsoft.com/office/drawing/2010/main" val="0"/>
+                </a:ext>
+              </a:extLst>
+            </a:blip>
+            <a:stretch>
+              <a:fillRect/>
+            </a:stretch>
+          </p:blipFill>
+          <p:spPr>
+            <a:xfrm>
+              <a:off x="379525" y="3275045"/>
+              <a:ext cx="4894140" cy="4134092"/>
+            </a:xfrm>
+            <a:prstGeom prst="rect">
+              <a:avLst/>
+            </a:prstGeom>
+          </p:spPr>
+        </p:pic>
+      </p:grpSp>
+      <p:sp>
+        <p:nvSpPr>
+          <p:cNvPr id="9" name="TextBox 8">
+            <a:extLst>
+              <a:ext uri="{FF2B5EF4-FFF2-40B4-BE49-F238E27FC236}">
+                <a16:creationId xmlns:a16="http://schemas.microsoft.com/office/drawing/2014/main" id="{13334DF1-1E27-78E7-AEA6-EA0BEA5B5AEB}"/>
+              </a:ext>
+            </a:extLst>
+          </p:cNvPr>
+          <p:cNvSpPr txBox="1"/>
+          <p:nvPr/>
+        </p:nvSpPr>
+        <p:spPr>
+          <a:xfrm>
+            <a:off x="4791075" y="523875"/>
+            <a:ext cx="5450531" cy="1754326"/>
+          </a:xfrm>
+          <a:prstGeom prst="rect">
+            <a:avLst/>
+          </a:prstGeom>
+          <a:noFill/>
+        </p:spPr>
+        <p:txBody>
+          <a:bodyPr wrap="none" rtlCol="0">
+            <a:spAutoFit/>
+          </a:bodyPr>
+          <a:lstStyle/>
+          <a:p>
+            <a:r>
+              <a:rPr lang="en-US" altLang="ko-KR" dirty="0"/>
+              <a:t>Body = </a:t>
+            </a:r>
+            <a:r>
+              <a:rPr lang="ko-KR" altLang="en-US" dirty="0"/>
+              <a:t>사람 모양 부분에 생성될 문자들 동적 배열</a:t>
+            </a:r>
+            <a:endParaRPr lang="en-US" altLang="ko-KR" dirty="0"/>
+          </a:p>
+          <a:p>
+            <a:r>
+              <a:rPr lang="en-US" altLang="ko-KR" dirty="0"/>
+              <a:t>Id = </a:t>
+            </a:r>
+            <a:r>
+              <a:rPr lang="ko-KR" altLang="en-US" dirty="0"/>
+              <a:t>생성한 난수</a:t>
+            </a:r>
+            <a:endParaRPr lang="en-US" altLang="ko-KR" dirty="0"/>
+          </a:p>
+          <a:p>
+            <a:r>
+              <a:rPr lang="en-US" altLang="ko-KR" dirty="0"/>
+              <a:t>Word = </a:t>
+            </a:r>
+            <a:r>
+              <a:rPr lang="ko-KR" altLang="en-US" dirty="0"/>
+              <a:t>난수 인덱스에 해당하는 문자열</a:t>
+            </a:r>
+            <a:endParaRPr lang="en-US" altLang="ko-KR" dirty="0"/>
+          </a:p>
+          <a:p>
+            <a:r>
+              <a:rPr lang="en-US" altLang="ko-KR" dirty="0"/>
+              <a:t>Len = </a:t>
+            </a:r>
+            <a:r>
+              <a:rPr lang="ko-KR" altLang="en-US" dirty="0"/>
+              <a:t>해당 문자열의 길이</a:t>
+            </a:r>
+            <a:endParaRPr lang="en-US" altLang="ko-KR" dirty="0"/>
+          </a:p>
+          <a:p>
+            <a:r>
+              <a:rPr lang="en-US" altLang="ko-KR" dirty="0" err="1"/>
+              <a:t>Gussed</a:t>
+            </a:r>
+            <a:r>
+              <a:rPr lang="en-US" altLang="ko-KR" dirty="0"/>
+              <a:t> = </a:t>
+            </a:r>
+            <a:r>
+              <a:rPr lang="ko-KR" altLang="en-US" dirty="0"/>
+              <a:t>문자열의 길이만큼 동적 할당된 주소 값</a:t>
+            </a:r>
+            <a:endParaRPr lang="en-US" altLang="ko-KR" dirty="0"/>
+          </a:p>
+          <a:p>
+            <a:r>
+              <a:rPr lang="en-US" altLang="ko-KR" dirty="0" err="1"/>
+              <a:t>falseWord</a:t>
+            </a:r>
+            <a:r>
+              <a:rPr lang="en-US" altLang="ko-KR" dirty="0"/>
+              <a:t> = </a:t>
+            </a:r>
+            <a:r>
+              <a:rPr lang="ko-KR" altLang="en-US" dirty="0"/>
+              <a:t>틀린 문자가 입력될 배열</a:t>
+            </a:r>
+            <a:endParaRPr lang="en-US" altLang="ko-KR" dirty="0"/>
+          </a:p>
+        </p:txBody>
+      </p:sp>
+    </p:spTree>
+    <p:extLst>
+      <p:ext uri="{BB962C8B-B14F-4D97-AF65-F5344CB8AC3E}">
+        <p14:creationId xmlns:p14="http://schemas.microsoft.com/office/powerpoint/2010/main" val="387479139"/>
+      </p:ext>
+    </p:extLst>
+  </p:cSld>
+  <p:clrMapOvr>
+    <a:masterClrMapping/>
+  </p:clrMapOvr>
+</p:sld>
+</file>
+
 <file path=ppt/theme/theme1.xml><?xml version="1.0" encoding="utf-8"?>
 <a:theme xmlns:a="http://schemas.openxmlformats.org/drawingml/2006/main" name="Office 테마">
   <a:themeElements>
@@ -4355,6 +4587,21 @@
 </file>
 
 <file path=customXml/item1.xml><?xml version="1.0" encoding="utf-8"?>
+<p:properties xmlns:p="http://schemas.microsoft.com/office/2006/metadata/properties" xmlns:xsi="http://www.w3.org/2001/XMLSchema-instance" xmlns:pc="http://schemas.microsoft.com/office/infopath/2007/PartnerControls">
+  <documentManagement/>
+</p:properties>
+</file>
+
+<file path=customXml/item2.xml><?xml version="1.0" encoding="utf-8"?>
+<?mso-contentType ?>
+<FormTemplates xmlns="http://schemas.microsoft.com/sharepoint/v3/contenttype/forms">
+  <Display>DocumentLibraryForm</Display>
+  <Edit>DocumentLibraryForm</Edit>
+  <New>DocumentLibraryForm</New>
+</FormTemplates>
+</file>
+
+<file path=customXml/item3.xml><?xml version="1.0" encoding="utf-8"?>
 <ct:contentTypeSchema xmlns:ct="http://schemas.microsoft.com/office/2006/metadata/contentType" xmlns:ma="http://schemas.microsoft.com/office/2006/metadata/properties/metaAttributes" ct:_="" ma:_="" ma:contentTypeName="문서" ma:contentTypeID="0x010100738BC76C140FF841B90503D8C8003180" ma:contentTypeVersion="2" ma:contentTypeDescription="새 문서를 만듭니다." ma:contentTypeScope="" ma:versionID="4ef3a109d44bfbd01a8b12db41a7a37c">
   <xsd:schema xmlns:xsd="http://www.w3.org/2001/XMLSchema" xmlns:xs="http://www.w3.org/2001/XMLSchema" xmlns:p="http://schemas.microsoft.com/office/2006/metadata/properties" xmlns:ns3="769d69be-a551-4dea-87dc-b2dce3a50957" targetNamespace="http://schemas.microsoft.com/office/2006/metadata/properties" ma:root="true" ma:fieldsID="4928e571c86f2c20f089c636bf7fd564" ns3:_="">
     <xsd:import namespace="769d69be-a551-4dea-87dc-b2dce3a50957"/>
@@ -4486,22 +4733,31 @@
 </ct:contentTypeSchema>
 </file>
 
-<file path=customXml/item2.xml><?xml version="1.0" encoding="utf-8"?>
-<?mso-contentType ?>
-<FormTemplates xmlns="http://schemas.microsoft.com/sharepoint/v3/contenttype/forms">
-  <Display>DocumentLibraryForm</Display>
-  <Edit>DocumentLibraryForm</Edit>
-  <New>DocumentLibraryForm</New>
-</FormTemplates>
+<file path=customXml/itemProps1.xml><?xml version="1.0" encoding="utf-8"?>
+<ds:datastoreItem xmlns:ds="http://schemas.openxmlformats.org/officeDocument/2006/customXml" ds:itemID="{7A3D1B60-2331-4CD4-8ED6-DCF62FC4AEBF}">
+  <ds:schemaRefs>
+    <ds:schemaRef ds:uri="http://purl.org/dc/dcmitype/"/>
+    <ds:schemaRef ds:uri="http://purl.org/dc/terms/"/>
+    <ds:schemaRef ds:uri="http://schemas.microsoft.com/office/2006/metadata/properties"/>
+    <ds:schemaRef ds:uri="http://www.w3.org/XML/1998/namespace"/>
+    <ds:schemaRef ds:uri="http://schemas.microsoft.com/office/infopath/2007/PartnerControls"/>
+    <ds:schemaRef ds:uri="http://schemas.microsoft.com/office/2006/documentManagement/types"/>
+    <ds:schemaRef ds:uri="http://schemas.openxmlformats.org/package/2006/metadata/core-properties"/>
+    <ds:schemaRef ds:uri="769d69be-a551-4dea-87dc-b2dce3a50957"/>
+    <ds:schemaRef ds:uri="http://purl.org/dc/elements/1.1/"/>
+  </ds:schemaRefs>
+</ds:datastoreItem>
 </file>
 
-<file path=customXml/item3.xml><?xml version="1.0" encoding="utf-8"?>
-<p:properties xmlns:p="http://schemas.microsoft.com/office/2006/metadata/properties" xmlns:xsi="http://www.w3.org/2001/XMLSchema-instance" xmlns:pc="http://schemas.microsoft.com/office/infopath/2007/PartnerControls">
-  <documentManagement/>
-</p:properties>
+<file path=customXml/itemProps2.xml><?xml version="1.0" encoding="utf-8"?>
+<ds:datastoreItem xmlns:ds="http://schemas.openxmlformats.org/officeDocument/2006/customXml" ds:itemID="{FF90578C-7E0D-4E0F-A094-0F669E53ABEF}">
+  <ds:schemaRefs>
+    <ds:schemaRef ds:uri="http://schemas.microsoft.com/sharepoint/v3/contenttype/forms"/>
+  </ds:schemaRefs>
+</ds:datastoreItem>
 </file>
 
-<file path=customXml/itemProps1.xml><?xml version="1.0" encoding="utf-8"?>
+<file path=customXml/itemProps3.xml><?xml version="1.0" encoding="utf-8"?>
 <ds:datastoreItem xmlns:ds="http://schemas.openxmlformats.org/officeDocument/2006/customXml" ds:itemID="{B71D1CF1-D7AC-41E0-A64B-6084E4A3E31C}">
   <ds:schemaRefs>
     <ds:schemaRef ds:uri="http://schemas.microsoft.com/office/2006/metadata/contentType"/>
@@ -4517,28 +4773,4 @@
     <ds:schemaRef ds:uri="http://schemas.microsoft.com/internal/obd"/>
   </ds:schemaRefs>
 </ds:datastoreItem>
-</file>
-
-<file path=customXml/itemProps2.xml><?xml version="1.0" encoding="utf-8"?>
-<ds:datastoreItem xmlns:ds="http://schemas.openxmlformats.org/officeDocument/2006/customXml" ds:itemID="{FF90578C-7E0D-4E0F-A094-0F669E53ABEF}">
-  <ds:schemaRefs>
-    <ds:schemaRef ds:uri="http://schemas.microsoft.com/sharepoint/v3/contenttype/forms"/>
-  </ds:schemaRefs>
-</ds:datastoreItem>
-</file>
-
-<file path=customXml/itemProps3.xml><?xml version="1.0" encoding="utf-8"?>
-<ds:datastoreItem xmlns:ds="http://schemas.openxmlformats.org/officeDocument/2006/customXml" ds:itemID="{7A3D1B60-2331-4CD4-8ED6-DCF62FC4AEBF}">
-  <ds:schemaRefs>
-    <ds:schemaRef ds:uri="http://purl.org/dc/dcmitype/"/>
-    <ds:schemaRef ds:uri="http://purl.org/dc/terms/"/>
-    <ds:schemaRef ds:uri="http://schemas.microsoft.com/office/2006/metadata/properties"/>
-    <ds:schemaRef ds:uri="http://www.w3.org/XML/1998/namespace"/>
-    <ds:schemaRef ds:uri="http://schemas.microsoft.com/office/infopath/2007/PartnerControls"/>
-    <ds:schemaRef ds:uri="http://schemas.microsoft.com/office/2006/documentManagement/types"/>
-    <ds:schemaRef ds:uri="http://schemas.openxmlformats.org/package/2006/metadata/core-properties"/>
-    <ds:schemaRef ds:uri="769d69be-a551-4dea-87dc-b2dce3a50957"/>
-    <ds:schemaRef ds:uri="http://purl.org/dc/elements/1.1/"/>
-  </ds:schemaRefs>
-</ds:datastoreItem>
 </file>
</xml_diff>